<commit_message>
Massive update with 2019-20 changes
Extensive reorganization and rewriting
</commit_message>
<xml_diff>
--- a/book_chapters_LaTeX_original/images/i02j0igraph.pptx
+++ b/book_chapters_LaTeX_original/images/i02j0igraph.pptx
@@ -6,6 +6,7 @@
   </p:sldMasterIdLst>
   <p:sldIdLst>
     <p:sldId id="256" r:id="rId2"/>
+    <p:sldId id="257" r:id="rId3"/>
   </p:sldIdLst>
   <p:sldSz cx="9144000" cy="6858000" type="screen4x3"/>
   <p:notesSz cx="6858000" cy="9144000"/>
@@ -104,6 +105,22 @@
       </a:defRPr>
     </a:lvl9pPr>
   </p:defaultTextStyle>
+  <p:extLst>
+    <p:ext uri="{EFAFB233-063F-42B5-8137-9DF3F51BA10A}">
+      <p15:sldGuideLst xmlns:p15="http://schemas.microsoft.com/office/powerpoint/2012/main">
+        <p15:guide id="1" orient="horz" pos="2160">
+          <p15:clr>
+            <a:srgbClr val="A4A3A4"/>
+          </p15:clr>
+        </p15:guide>
+        <p15:guide id="2" pos="2880">
+          <p15:clr>
+            <a:srgbClr val="A4A3A4"/>
+          </p15:clr>
+        </p15:guide>
+      </p15:sldGuideLst>
+    </p:ext>
+  </p:extLst>
 </p:presentation>
 </file>
 
@@ -145,7 +162,7 @@
           <a:lstStyle/>
           <a:p>
             <a:r>
-              <a:rPr lang="en-US" smtClean="0"/>
+              <a:rPr lang="en-US"/>
               <a:t>Click to edit Master title style</a:t>
             </a:r>
             <a:endParaRPr lang="fr-FR"/>
@@ -264,7 +281,7 @@
           </a:lstStyle>
           <a:p>
             <a:r>
-              <a:rPr lang="en-US" smtClean="0"/>
+              <a:rPr lang="en-US"/>
               <a:t>Click to edit Master subtitle style</a:t>
             </a:r>
             <a:endParaRPr lang="fr-FR"/>
@@ -288,7 +305,7 @@
           <a:p>
             <a:fld id="{8BA8330E-9FC5-496D-88BD-B17BB0077CDE}" type="datetimeFigureOut">
               <a:rPr lang="fr-FR" smtClean="0"/>
-              <a:t>17/02/2016</a:t>
+              <a:t>25/07/2020</a:t>
             </a:fld>
             <a:endParaRPr lang="fr-FR"/>
           </a:p>
@@ -382,7 +399,7 @@
           <a:lstStyle/>
           <a:p>
             <a:r>
-              <a:rPr lang="en-US" smtClean="0"/>
+              <a:rPr lang="en-US"/>
               <a:t>Click to edit Master title style</a:t>
             </a:r>
             <a:endParaRPr lang="fr-FR"/>
@@ -406,35 +423,35 @@
           <a:p>
             <a:pPr lvl="0"/>
             <a:r>
-              <a:rPr lang="en-US" smtClean="0"/>
+              <a:rPr lang="en-US"/>
               <a:t>Click to edit Master text styles</a:t>
             </a:r>
           </a:p>
           <a:p>
             <a:pPr lvl="1"/>
             <a:r>
-              <a:rPr lang="en-US" smtClean="0"/>
+              <a:rPr lang="en-US"/>
               <a:t>Second level</a:t>
             </a:r>
           </a:p>
           <a:p>
             <a:pPr lvl="2"/>
             <a:r>
-              <a:rPr lang="en-US" smtClean="0"/>
+              <a:rPr lang="en-US"/>
               <a:t>Third level</a:t>
             </a:r>
           </a:p>
           <a:p>
             <a:pPr lvl="3"/>
             <a:r>
-              <a:rPr lang="en-US" smtClean="0"/>
+              <a:rPr lang="en-US"/>
               <a:t>Fourth level</a:t>
             </a:r>
           </a:p>
           <a:p>
             <a:pPr lvl="4"/>
             <a:r>
-              <a:rPr lang="en-US" smtClean="0"/>
+              <a:rPr lang="en-US"/>
               <a:t>Fifth level</a:t>
             </a:r>
             <a:endParaRPr lang="fr-FR"/>
@@ -458,7 +475,7 @@
           <a:p>
             <a:fld id="{8BA8330E-9FC5-496D-88BD-B17BB0077CDE}" type="datetimeFigureOut">
               <a:rPr lang="fr-FR" smtClean="0"/>
-              <a:t>17/02/2016</a:t>
+              <a:t>25/07/2020</a:t>
             </a:fld>
             <a:endParaRPr lang="fr-FR"/>
           </a:p>
@@ -557,7 +574,7 @@
           <a:lstStyle/>
           <a:p>
             <a:r>
-              <a:rPr lang="en-US" smtClean="0"/>
+              <a:rPr lang="en-US"/>
               <a:t>Click to edit Master title style</a:t>
             </a:r>
             <a:endParaRPr lang="fr-FR"/>
@@ -586,35 +603,35 @@
           <a:p>
             <a:pPr lvl="0"/>
             <a:r>
-              <a:rPr lang="en-US" smtClean="0"/>
+              <a:rPr lang="en-US"/>
               <a:t>Click to edit Master text styles</a:t>
             </a:r>
           </a:p>
           <a:p>
             <a:pPr lvl="1"/>
             <a:r>
-              <a:rPr lang="en-US" smtClean="0"/>
+              <a:rPr lang="en-US"/>
               <a:t>Second level</a:t>
             </a:r>
           </a:p>
           <a:p>
             <a:pPr lvl="2"/>
             <a:r>
-              <a:rPr lang="en-US" smtClean="0"/>
+              <a:rPr lang="en-US"/>
               <a:t>Third level</a:t>
             </a:r>
           </a:p>
           <a:p>
             <a:pPr lvl="3"/>
             <a:r>
-              <a:rPr lang="en-US" smtClean="0"/>
+              <a:rPr lang="en-US"/>
               <a:t>Fourth level</a:t>
             </a:r>
           </a:p>
           <a:p>
             <a:pPr lvl="4"/>
             <a:r>
-              <a:rPr lang="en-US" smtClean="0"/>
+              <a:rPr lang="en-US"/>
               <a:t>Fifth level</a:t>
             </a:r>
             <a:endParaRPr lang="fr-FR"/>
@@ -638,7 +655,7 @@
           <a:p>
             <a:fld id="{8BA8330E-9FC5-496D-88BD-B17BB0077CDE}" type="datetimeFigureOut">
               <a:rPr lang="fr-FR" smtClean="0"/>
-              <a:t>17/02/2016</a:t>
+              <a:t>25/07/2020</a:t>
             </a:fld>
             <a:endParaRPr lang="fr-FR"/>
           </a:p>
@@ -732,7 +749,7 @@
           <a:lstStyle/>
           <a:p>
             <a:r>
-              <a:rPr lang="en-US" smtClean="0"/>
+              <a:rPr lang="en-US"/>
               <a:t>Click to edit Master title style</a:t>
             </a:r>
             <a:endParaRPr lang="fr-FR"/>
@@ -756,35 +773,35 @@
           <a:p>
             <a:pPr lvl="0"/>
             <a:r>
-              <a:rPr lang="en-US" smtClean="0"/>
+              <a:rPr lang="en-US"/>
               <a:t>Click to edit Master text styles</a:t>
             </a:r>
           </a:p>
           <a:p>
             <a:pPr lvl="1"/>
             <a:r>
-              <a:rPr lang="en-US" smtClean="0"/>
+              <a:rPr lang="en-US"/>
               <a:t>Second level</a:t>
             </a:r>
           </a:p>
           <a:p>
             <a:pPr lvl="2"/>
             <a:r>
-              <a:rPr lang="en-US" smtClean="0"/>
+              <a:rPr lang="en-US"/>
               <a:t>Third level</a:t>
             </a:r>
           </a:p>
           <a:p>
             <a:pPr lvl="3"/>
             <a:r>
-              <a:rPr lang="en-US" smtClean="0"/>
+              <a:rPr lang="en-US"/>
               <a:t>Fourth level</a:t>
             </a:r>
           </a:p>
           <a:p>
             <a:pPr lvl="4"/>
             <a:r>
-              <a:rPr lang="en-US" smtClean="0"/>
+              <a:rPr lang="en-US"/>
               <a:t>Fifth level</a:t>
             </a:r>
             <a:endParaRPr lang="fr-FR"/>
@@ -808,7 +825,7 @@
           <a:p>
             <a:fld id="{8BA8330E-9FC5-496D-88BD-B17BB0077CDE}" type="datetimeFigureOut">
               <a:rPr lang="fr-FR" smtClean="0"/>
-              <a:t>17/02/2016</a:t>
+              <a:t>25/07/2020</a:t>
             </a:fld>
             <a:endParaRPr lang="fr-FR"/>
           </a:p>
@@ -911,7 +928,7 @@
           </a:lstStyle>
           <a:p>
             <a:r>
-              <a:rPr lang="en-US" smtClean="0"/>
+              <a:rPr lang="en-US"/>
               <a:t>Click to edit Master title style</a:t>
             </a:r>
             <a:endParaRPr lang="fr-FR"/>
@@ -1031,7 +1048,7 @@
           <a:p>
             <a:pPr lvl="0"/>
             <a:r>
-              <a:rPr lang="en-US" smtClean="0"/>
+              <a:rPr lang="en-US"/>
               <a:t>Click to edit Master text styles</a:t>
             </a:r>
           </a:p>
@@ -1054,7 +1071,7 @@
           <a:p>
             <a:fld id="{8BA8330E-9FC5-496D-88BD-B17BB0077CDE}" type="datetimeFigureOut">
               <a:rPr lang="fr-FR" smtClean="0"/>
-              <a:t>17/02/2016</a:t>
+              <a:t>25/07/2020</a:t>
             </a:fld>
             <a:endParaRPr lang="fr-FR"/>
           </a:p>
@@ -1148,7 +1165,7 @@
           <a:lstStyle/>
           <a:p>
             <a:r>
-              <a:rPr lang="en-US" smtClean="0"/>
+              <a:rPr lang="en-US"/>
               <a:t>Click to edit Master title style</a:t>
             </a:r>
             <a:endParaRPr lang="fr-FR"/>
@@ -1205,35 +1222,35 @@
           <a:p>
             <a:pPr lvl="0"/>
             <a:r>
-              <a:rPr lang="en-US" smtClean="0"/>
+              <a:rPr lang="en-US"/>
               <a:t>Click to edit Master text styles</a:t>
             </a:r>
           </a:p>
           <a:p>
             <a:pPr lvl="1"/>
             <a:r>
-              <a:rPr lang="en-US" smtClean="0"/>
+              <a:rPr lang="en-US"/>
               <a:t>Second level</a:t>
             </a:r>
           </a:p>
           <a:p>
             <a:pPr lvl="2"/>
             <a:r>
-              <a:rPr lang="en-US" smtClean="0"/>
+              <a:rPr lang="en-US"/>
               <a:t>Third level</a:t>
             </a:r>
           </a:p>
           <a:p>
             <a:pPr lvl="3"/>
             <a:r>
-              <a:rPr lang="en-US" smtClean="0"/>
+              <a:rPr lang="en-US"/>
               <a:t>Fourth level</a:t>
             </a:r>
           </a:p>
           <a:p>
             <a:pPr lvl="4"/>
             <a:r>
-              <a:rPr lang="en-US" smtClean="0"/>
+              <a:rPr lang="en-US"/>
               <a:t>Fifth level</a:t>
             </a:r>
             <a:endParaRPr lang="fr-FR"/>
@@ -1290,35 +1307,35 @@
           <a:p>
             <a:pPr lvl="0"/>
             <a:r>
-              <a:rPr lang="en-US" smtClean="0"/>
+              <a:rPr lang="en-US"/>
               <a:t>Click to edit Master text styles</a:t>
             </a:r>
           </a:p>
           <a:p>
             <a:pPr lvl="1"/>
             <a:r>
-              <a:rPr lang="en-US" smtClean="0"/>
+              <a:rPr lang="en-US"/>
               <a:t>Second level</a:t>
             </a:r>
           </a:p>
           <a:p>
             <a:pPr lvl="2"/>
             <a:r>
-              <a:rPr lang="en-US" smtClean="0"/>
+              <a:rPr lang="en-US"/>
               <a:t>Third level</a:t>
             </a:r>
           </a:p>
           <a:p>
             <a:pPr lvl="3"/>
             <a:r>
-              <a:rPr lang="en-US" smtClean="0"/>
+              <a:rPr lang="en-US"/>
               <a:t>Fourth level</a:t>
             </a:r>
           </a:p>
           <a:p>
             <a:pPr lvl="4"/>
             <a:r>
-              <a:rPr lang="en-US" smtClean="0"/>
+              <a:rPr lang="en-US"/>
               <a:t>Fifth level</a:t>
             </a:r>
             <a:endParaRPr lang="fr-FR"/>
@@ -1342,7 +1359,7 @@
           <a:p>
             <a:fld id="{8BA8330E-9FC5-496D-88BD-B17BB0077CDE}" type="datetimeFigureOut">
               <a:rPr lang="fr-FR" smtClean="0"/>
-              <a:t>17/02/2016</a:t>
+              <a:t>25/07/2020</a:t>
             </a:fld>
             <a:endParaRPr lang="fr-FR"/>
           </a:p>
@@ -1440,7 +1457,7 @@
           </a:lstStyle>
           <a:p>
             <a:r>
-              <a:rPr lang="en-US" smtClean="0"/>
+              <a:rPr lang="en-US"/>
               <a:t>Click to edit Master title style</a:t>
             </a:r>
             <a:endParaRPr lang="fr-FR"/>
@@ -1506,7 +1523,7 @@
           <a:p>
             <a:pPr lvl="0"/>
             <a:r>
-              <a:rPr lang="en-US" smtClean="0"/>
+              <a:rPr lang="en-US"/>
               <a:t>Click to edit Master text styles</a:t>
             </a:r>
           </a:p>
@@ -1562,35 +1579,35 @@
           <a:p>
             <a:pPr lvl="0"/>
             <a:r>
-              <a:rPr lang="en-US" smtClean="0"/>
+              <a:rPr lang="en-US"/>
               <a:t>Click to edit Master text styles</a:t>
             </a:r>
           </a:p>
           <a:p>
             <a:pPr lvl="1"/>
             <a:r>
-              <a:rPr lang="en-US" smtClean="0"/>
+              <a:rPr lang="en-US"/>
               <a:t>Second level</a:t>
             </a:r>
           </a:p>
           <a:p>
             <a:pPr lvl="2"/>
             <a:r>
-              <a:rPr lang="en-US" smtClean="0"/>
+              <a:rPr lang="en-US"/>
               <a:t>Third level</a:t>
             </a:r>
           </a:p>
           <a:p>
             <a:pPr lvl="3"/>
             <a:r>
-              <a:rPr lang="en-US" smtClean="0"/>
+              <a:rPr lang="en-US"/>
               <a:t>Fourth level</a:t>
             </a:r>
           </a:p>
           <a:p>
             <a:pPr lvl="4"/>
             <a:r>
-              <a:rPr lang="en-US" smtClean="0"/>
+              <a:rPr lang="en-US"/>
               <a:t>Fifth level</a:t>
             </a:r>
             <a:endParaRPr lang="fr-FR"/>
@@ -1656,7 +1673,7 @@
           <a:p>
             <a:pPr lvl="0"/>
             <a:r>
-              <a:rPr lang="en-US" smtClean="0"/>
+              <a:rPr lang="en-US"/>
               <a:t>Click to edit Master text styles</a:t>
             </a:r>
           </a:p>
@@ -1712,35 +1729,35 @@
           <a:p>
             <a:pPr lvl="0"/>
             <a:r>
-              <a:rPr lang="en-US" smtClean="0"/>
+              <a:rPr lang="en-US"/>
               <a:t>Click to edit Master text styles</a:t>
             </a:r>
           </a:p>
           <a:p>
             <a:pPr lvl="1"/>
             <a:r>
-              <a:rPr lang="en-US" smtClean="0"/>
+              <a:rPr lang="en-US"/>
               <a:t>Second level</a:t>
             </a:r>
           </a:p>
           <a:p>
             <a:pPr lvl="2"/>
             <a:r>
-              <a:rPr lang="en-US" smtClean="0"/>
+              <a:rPr lang="en-US"/>
               <a:t>Third level</a:t>
             </a:r>
           </a:p>
           <a:p>
             <a:pPr lvl="3"/>
             <a:r>
-              <a:rPr lang="en-US" smtClean="0"/>
+              <a:rPr lang="en-US"/>
               <a:t>Fourth level</a:t>
             </a:r>
           </a:p>
           <a:p>
             <a:pPr lvl="4"/>
             <a:r>
-              <a:rPr lang="en-US" smtClean="0"/>
+              <a:rPr lang="en-US"/>
               <a:t>Fifth level</a:t>
             </a:r>
             <a:endParaRPr lang="fr-FR"/>
@@ -1764,7 +1781,7 @@
           <a:p>
             <a:fld id="{8BA8330E-9FC5-496D-88BD-B17BB0077CDE}" type="datetimeFigureOut">
               <a:rPr lang="fr-FR" smtClean="0"/>
-              <a:t>17/02/2016</a:t>
+              <a:t>25/07/2020</a:t>
             </a:fld>
             <a:endParaRPr lang="fr-FR"/>
           </a:p>
@@ -1858,7 +1875,7 @@
           <a:lstStyle/>
           <a:p>
             <a:r>
-              <a:rPr lang="en-US" smtClean="0"/>
+              <a:rPr lang="en-US"/>
               <a:t>Click to edit Master title style</a:t>
             </a:r>
             <a:endParaRPr lang="fr-FR"/>
@@ -1882,7 +1899,7 @@
           <a:p>
             <a:fld id="{8BA8330E-9FC5-496D-88BD-B17BB0077CDE}" type="datetimeFigureOut">
               <a:rPr lang="fr-FR" smtClean="0"/>
-              <a:t>17/02/2016</a:t>
+              <a:t>25/07/2020</a:t>
             </a:fld>
             <a:endParaRPr lang="fr-FR"/>
           </a:p>
@@ -1977,7 +1994,7 @@
           <a:p>
             <a:fld id="{8BA8330E-9FC5-496D-88BD-B17BB0077CDE}" type="datetimeFigureOut">
               <a:rPr lang="fr-FR" smtClean="0"/>
-              <a:t>17/02/2016</a:t>
+              <a:t>25/07/2020</a:t>
             </a:fld>
             <a:endParaRPr lang="fr-FR"/>
           </a:p>
@@ -2080,7 +2097,7 @@
           </a:lstStyle>
           <a:p>
             <a:r>
-              <a:rPr lang="en-US" smtClean="0"/>
+              <a:rPr lang="en-US"/>
               <a:t>Click to edit Master title style</a:t>
             </a:r>
             <a:endParaRPr lang="fr-FR"/>
@@ -2137,35 +2154,35 @@
           <a:p>
             <a:pPr lvl="0"/>
             <a:r>
-              <a:rPr lang="en-US" smtClean="0"/>
+              <a:rPr lang="en-US"/>
               <a:t>Click to edit Master text styles</a:t>
             </a:r>
           </a:p>
           <a:p>
             <a:pPr lvl="1"/>
             <a:r>
-              <a:rPr lang="en-US" smtClean="0"/>
+              <a:rPr lang="en-US"/>
               <a:t>Second level</a:t>
             </a:r>
           </a:p>
           <a:p>
             <a:pPr lvl="2"/>
             <a:r>
-              <a:rPr lang="en-US" smtClean="0"/>
+              <a:rPr lang="en-US"/>
               <a:t>Third level</a:t>
             </a:r>
           </a:p>
           <a:p>
             <a:pPr lvl="3"/>
             <a:r>
-              <a:rPr lang="en-US" smtClean="0"/>
+              <a:rPr lang="en-US"/>
               <a:t>Fourth level</a:t>
             </a:r>
           </a:p>
           <a:p>
             <a:pPr lvl="4"/>
             <a:r>
-              <a:rPr lang="en-US" smtClean="0"/>
+              <a:rPr lang="en-US"/>
               <a:t>Fifth level</a:t>
             </a:r>
             <a:endParaRPr lang="fr-FR"/>
@@ -2231,7 +2248,7 @@
           <a:p>
             <a:pPr lvl="0"/>
             <a:r>
-              <a:rPr lang="en-US" smtClean="0"/>
+              <a:rPr lang="en-US"/>
               <a:t>Click to edit Master text styles</a:t>
             </a:r>
           </a:p>
@@ -2254,7 +2271,7 @@
           <a:p>
             <a:fld id="{8BA8330E-9FC5-496D-88BD-B17BB0077CDE}" type="datetimeFigureOut">
               <a:rPr lang="fr-FR" smtClean="0"/>
-              <a:t>17/02/2016</a:t>
+              <a:t>25/07/2020</a:t>
             </a:fld>
             <a:endParaRPr lang="fr-FR"/>
           </a:p>
@@ -2357,7 +2374,7 @@
           </a:lstStyle>
           <a:p>
             <a:r>
-              <a:rPr lang="en-US" smtClean="0"/>
+              <a:rPr lang="en-US"/>
               <a:t>Click to edit Master title style</a:t>
             </a:r>
             <a:endParaRPr lang="fr-FR"/>
@@ -2484,7 +2501,7 @@
           <a:p>
             <a:pPr lvl="0"/>
             <a:r>
-              <a:rPr lang="en-US" smtClean="0"/>
+              <a:rPr lang="en-US"/>
               <a:t>Click to edit Master text styles</a:t>
             </a:r>
           </a:p>
@@ -2507,7 +2524,7 @@
           <a:p>
             <a:fld id="{8BA8330E-9FC5-496D-88BD-B17BB0077CDE}" type="datetimeFigureOut">
               <a:rPr lang="fr-FR" smtClean="0"/>
-              <a:t>17/02/2016</a:t>
+              <a:t>25/07/2020</a:t>
             </a:fld>
             <a:endParaRPr lang="fr-FR"/>
           </a:p>
@@ -2616,7 +2633,7 @@
           <a:lstStyle/>
           <a:p>
             <a:r>
-              <a:rPr lang="en-US" smtClean="0"/>
+              <a:rPr lang="en-US"/>
               <a:t>Click to edit Master title style</a:t>
             </a:r>
             <a:endParaRPr lang="fr-FR"/>
@@ -2650,35 +2667,35 @@
           <a:p>
             <a:pPr lvl="0"/>
             <a:r>
-              <a:rPr lang="en-US" smtClean="0"/>
+              <a:rPr lang="en-US"/>
               <a:t>Click to edit Master text styles</a:t>
             </a:r>
           </a:p>
           <a:p>
             <a:pPr lvl="1"/>
             <a:r>
-              <a:rPr lang="en-US" smtClean="0"/>
+              <a:rPr lang="en-US"/>
               <a:t>Second level</a:t>
             </a:r>
           </a:p>
           <a:p>
             <a:pPr lvl="2"/>
             <a:r>
-              <a:rPr lang="en-US" smtClean="0"/>
+              <a:rPr lang="en-US"/>
               <a:t>Third level</a:t>
             </a:r>
           </a:p>
           <a:p>
             <a:pPr lvl="3"/>
             <a:r>
-              <a:rPr lang="en-US" smtClean="0"/>
+              <a:rPr lang="en-US"/>
               <a:t>Fourth level</a:t>
             </a:r>
           </a:p>
           <a:p>
             <a:pPr lvl="4"/>
             <a:r>
-              <a:rPr lang="en-US" smtClean="0"/>
+              <a:rPr lang="en-US"/>
               <a:t>Fifth level</a:t>
             </a:r>
             <a:endParaRPr lang="fr-FR"/>
@@ -2720,7 +2737,7 @@
           <a:p>
             <a:fld id="{8BA8330E-9FC5-496D-88BD-B17BB0077CDE}" type="datetimeFigureOut">
               <a:rPr lang="fr-FR" smtClean="0"/>
-              <a:t>17/02/2016</a:t>
+              <a:t>25/07/2020</a:t>
             </a:fld>
             <a:endParaRPr lang="fr-FR"/>
           </a:p>
@@ -3118,7 +3135,7 @@
           <a:lstStyle/>
           <a:p>
             <a:r>
-              <a:rPr lang="en-US" sz="7200" dirty="0" smtClean="0">
+              <a:rPr lang="en-US" sz="7200" dirty="0">
                 <a:latin typeface="Times New Roman" panose="02020603050405020304" pitchFamily="18" charset="0"/>
               </a:rPr>
               <a:t>.</a:t>
@@ -3152,7 +3169,7 @@
           <a:lstStyle/>
           <a:p>
             <a:r>
-              <a:rPr lang="en-US" sz="7200" dirty="0" smtClean="0">
+              <a:rPr lang="en-US" sz="7200" dirty="0">
                 <a:latin typeface="Times New Roman" panose="02020603050405020304" pitchFamily="18" charset="0"/>
               </a:rPr>
               <a:t>.</a:t>
@@ -3186,7 +3203,7 @@
           <a:lstStyle/>
           <a:p>
             <a:r>
-              <a:rPr lang="en-US" sz="7200" dirty="0" smtClean="0">
+              <a:rPr lang="en-US" sz="7200" dirty="0">
                 <a:latin typeface="Times New Roman" panose="02020603050405020304" pitchFamily="18" charset="0"/>
               </a:rPr>
               <a:t>.</a:t>
@@ -3220,7 +3237,7 @@
           <a:lstStyle/>
           <a:p>
             <a:r>
-              <a:rPr lang="en-US" sz="7200" dirty="0" smtClean="0">
+              <a:rPr lang="en-US" sz="7200" dirty="0">
                 <a:latin typeface="Times New Roman" panose="02020603050405020304" pitchFamily="18" charset="0"/>
               </a:rPr>
               <a:t>.</a:t>
@@ -3254,7 +3271,7 @@
           <a:lstStyle/>
           <a:p>
             <a:r>
-              <a:rPr lang="en-US" sz="7200" dirty="0" smtClean="0">
+              <a:rPr lang="en-US" sz="7200" dirty="0">
                 <a:latin typeface="Times New Roman" panose="02020603050405020304" pitchFamily="18" charset="0"/>
               </a:rPr>
               <a:t>.</a:t>
@@ -3288,7 +3305,7 @@
           <a:lstStyle/>
           <a:p>
             <a:r>
-              <a:rPr lang="en-US" sz="7200" dirty="0" smtClean="0">
+              <a:rPr lang="en-US" sz="7200" dirty="0">
                 <a:latin typeface="Times New Roman" panose="02020603050405020304" pitchFamily="18" charset="0"/>
               </a:rPr>
               <a:t>.</a:t>
@@ -3322,7 +3339,7 @@
           <a:lstStyle/>
           <a:p>
             <a:r>
-              <a:rPr lang="en-US" sz="7200" dirty="0" smtClean="0">
+              <a:rPr lang="en-US" sz="7200" dirty="0">
                 <a:latin typeface="Times New Roman" panose="02020603050405020304" pitchFamily="18" charset="0"/>
               </a:rPr>
               <a:t>.</a:t>
@@ -3428,7 +3445,7 @@
           <a:lstStyle/>
           <a:p>
             <a:r>
-              <a:rPr lang="en-US" dirty="0" smtClean="0">
+              <a:rPr lang="en-US" dirty="0">
                 <a:latin typeface="Times New Roman" panose="02020603050405020304" pitchFamily="18" charset="0"/>
               </a:rPr>
               <a:t>(0,0)</a:t>
@@ -3462,7 +3479,7 @@
           <a:lstStyle/>
           <a:p>
             <a:r>
-              <a:rPr lang="en-US" dirty="0" smtClean="0">
+              <a:rPr lang="en-US" dirty="0">
                 <a:latin typeface="Times New Roman" panose="02020603050405020304" pitchFamily="18" charset="0"/>
               </a:rPr>
               <a:t>(2,0)</a:t>
@@ -3496,7 +3513,7 @@
           <a:lstStyle/>
           <a:p>
             <a:r>
-              <a:rPr lang="en-US" dirty="0" smtClean="0">
+              <a:rPr lang="en-US" dirty="0">
                 <a:latin typeface="Times New Roman" panose="02020603050405020304" pitchFamily="18" charset="0"/>
               </a:rPr>
               <a:t>(1,1)</a:t>
@@ -3530,7 +3547,7 @@
           <a:lstStyle/>
           <a:p>
             <a:r>
-              <a:rPr lang="en-US" dirty="0" smtClean="0">
+              <a:rPr lang="en-US" dirty="0">
                 <a:latin typeface="Times New Roman" panose="02020603050405020304" pitchFamily="18" charset="0"/>
               </a:rPr>
               <a:t>(2,1)</a:t>
@@ -3564,7 +3581,7 @@
           <a:lstStyle/>
           <a:p>
             <a:r>
-              <a:rPr lang="en-US" dirty="0" smtClean="0">
+              <a:rPr lang="en-US" dirty="0">
                 <a:latin typeface="Times New Roman" panose="02020603050405020304" pitchFamily="18" charset="0"/>
               </a:rPr>
               <a:t>(1,0)</a:t>
@@ -3598,7 +3615,7 @@
           <a:lstStyle/>
           <a:p>
             <a:r>
-              <a:rPr lang="en-US" dirty="0" smtClean="0">
+              <a:rPr lang="en-US" dirty="0">
                 <a:latin typeface="Times New Roman" panose="02020603050405020304" pitchFamily="18" charset="0"/>
               </a:rPr>
               <a:t>(2,2)</a:t>
@@ -3632,13 +3649,13 @@
           <a:lstStyle/>
           <a:p>
             <a:r>
-              <a:rPr lang="en-US" i="1" dirty="0" err="1" smtClean="0">
+              <a:rPr lang="en-US" i="1" dirty="0" err="1">
                 <a:latin typeface="Times New Roman" panose="02020603050405020304" pitchFamily="18" charset="0"/>
               </a:rPr>
               <a:t>i</a:t>
             </a:r>
             <a:r>
-              <a:rPr lang="en-US" dirty="0" smtClean="0">
+              <a:rPr lang="en-US" dirty="0">
                 <a:latin typeface="Times New Roman" panose="02020603050405020304" pitchFamily="18" charset="0"/>
               </a:rPr>
               <a:t> values</a:t>
@@ -3678,7 +3695,7 @@
               <a:t>j</a:t>
             </a:r>
             <a:r>
-              <a:rPr lang="en-US" dirty="0" smtClean="0">
+              <a:rPr lang="en-US" dirty="0">
                 <a:latin typeface="Times New Roman" panose="02020603050405020304" pitchFamily="18" charset="0"/>
               </a:rPr>
               <a:t> values</a:t>
@@ -3693,6 +3710,1631 @@
     <p:extLst>
       <p:ext uri="{BB962C8B-B14F-4D97-AF65-F5344CB8AC3E}">
         <p14:creationId xmlns:p14="http://schemas.microsoft.com/office/powerpoint/2010/main" val="757127018"/>
+      </p:ext>
+    </p:extLst>
+  </p:cSld>
+  <p:clrMapOvr>
+    <a:masterClrMapping/>
+  </p:clrMapOvr>
+</p:sld>
+</file>
+
+<file path=ppt/slides/slide2.xml><?xml version="1.0" encoding="utf-8"?>
+<p:sld xmlns:a="http://schemas.openxmlformats.org/drawingml/2006/main" xmlns:r="http://schemas.openxmlformats.org/officeDocument/2006/relationships" xmlns:p="http://schemas.openxmlformats.org/presentationml/2006/main">
+  <p:cSld>
+    <p:spTree>
+      <p:nvGrpSpPr>
+        <p:cNvPr id="1" name=""/>
+        <p:cNvGrpSpPr/>
+        <p:nvPr/>
+      </p:nvGrpSpPr>
+      <p:grpSpPr>
+        <a:xfrm>
+          <a:off x="0" y="0"/>
+          <a:ext cx="0" cy="0"/>
+          <a:chOff x="0" y="0"/>
+          <a:chExt cx="0" cy="0"/>
+        </a:xfrm>
+      </p:grpSpPr>
+      <p:grpSp>
+        <p:nvGrpSpPr>
+          <p:cNvPr id="8" name="Group 7">
+            <a:extLst>
+              <a:ext uri="{FF2B5EF4-FFF2-40B4-BE49-F238E27FC236}">
+                <a16:creationId xmlns:a16="http://schemas.microsoft.com/office/drawing/2014/main" id="{19D15504-FC13-43D7-929B-B7A6E3E39345}"/>
+              </a:ext>
+            </a:extLst>
+          </p:cNvPr>
+          <p:cNvGrpSpPr/>
+          <p:nvPr/>
+        </p:nvGrpSpPr>
+        <p:grpSpPr>
+          <a:xfrm>
+            <a:off x="2029698" y="3837997"/>
+            <a:ext cx="2282205" cy="352313"/>
+            <a:chOff x="2029698" y="3837997"/>
+            <a:chExt cx="2282205" cy="352313"/>
+          </a:xfrm>
+        </p:grpSpPr>
+        <p:sp>
+          <p:nvSpPr>
+            <p:cNvPr id="24" name="TextBox 23"/>
+            <p:cNvSpPr txBox="1"/>
+            <p:nvPr/>
+          </p:nvSpPr>
+          <p:spPr>
+            <a:xfrm>
+              <a:off x="2925254" y="3851756"/>
+              <a:ext cx="579005" cy="338554"/>
+            </a:xfrm>
+            <a:prstGeom prst="rect">
+              <a:avLst/>
+            </a:prstGeom>
+            <a:noFill/>
+          </p:spPr>
+          <p:txBody>
+            <a:bodyPr wrap="none" rtlCol="0">
+              <a:spAutoFit/>
+            </a:bodyPr>
+            <a:lstStyle/>
+            <a:p>
+              <a:r>
+                <a:rPr lang="en-US" sz="1600" dirty="0">
+                  <a:latin typeface="Times New Roman" panose="02020603050405020304" pitchFamily="18" charset="0"/>
+                </a:rPr>
+                <a:t>(1,1)</a:t>
+              </a:r>
+              <a:endParaRPr lang="fr-FR" sz="1600" dirty="0">
+                <a:latin typeface="Times New Roman" panose="02020603050405020304" pitchFamily="18" charset="0"/>
+              </a:endParaRPr>
+            </a:p>
+          </p:txBody>
+        </p:sp>
+        <p:sp>
+          <p:nvSpPr>
+            <p:cNvPr id="25" name="TextBox 24"/>
+            <p:cNvSpPr txBox="1"/>
+            <p:nvPr/>
+          </p:nvSpPr>
+          <p:spPr>
+            <a:xfrm>
+              <a:off x="3732898" y="3851756"/>
+              <a:ext cx="579005" cy="338554"/>
+            </a:xfrm>
+            <a:prstGeom prst="rect">
+              <a:avLst/>
+            </a:prstGeom>
+            <a:noFill/>
+          </p:spPr>
+          <p:txBody>
+            <a:bodyPr wrap="none" rtlCol="0">
+              <a:spAutoFit/>
+            </a:bodyPr>
+            <a:lstStyle/>
+            <a:p>
+              <a:r>
+                <a:rPr lang="en-US" sz="1600" dirty="0">
+                  <a:latin typeface="Times New Roman" panose="02020603050405020304" pitchFamily="18" charset="0"/>
+                </a:rPr>
+                <a:t>(2,1)</a:t>
+              </a:r>
+              <a:endParaRPr lang="fr-FR" sz="1600" dirty="0">
+                <a:latin typeface="Times New Roman" panose="02020603050405020304" pitchFamily="18" charset="0"/>
+              </a:endParaRPr>
+            </a:p>
+          </p:txBody>
+        </p:sp>
+        <p:sp>
+          <p:nvSpPr>
+            <p:cNvPr id="45" name="TextBox 44">
+              <a:extLst>
+                <a:ext uri="{FF2B5EF4-FFF2-40B4-BE49-F238E27FC236}">
+                  <a16:creationId xmlns:a16="http://schemas.microsoft.com/office/drawing/2014/main" id="{D4AA8241-A5A9-44FA-8CE6-9D1FAD18BCAF}"/>
+                </a:ext>
+              </a:extLst>
+            </p:cNvPr>
+            <p:cNvSpPr txBox="1"/>
+            <p:nvPr/>
+          </p:nvSpPr>
+          <p:spPr>
+            <a:xfrm>
+              <a:off x="2029698" y="3837997"/>
+              <a:ext cx="579005" cy="338554"/>
+            </a:xfrm>
+            <a:prstGeom prst="rect">
+              <a:avLst/>
+            </a:prstGeom>
+            <a:noFill/>
+          </p:spPr>
+          <p:txBody>
+            <a:bodyPr wrap="none" rtlCol="0">
+              <a:spAutoFit/>
+            </a:bodyPr>
+            <a:lstStyle/>
+            <a:p>
+              <a:r>
+                <a:rPr lang="en-US" sz="1600" dirty="0">
+                  <a:latin typeface="Times New Roman" panose="02020603050405020304" pitchFamily="18" charset="0"/>
+                </a:rPr>
+                <a:t>(0,1)</a:t>
+              </a:r>
+              <a:endParaRPr lang="fr-FR" sz="1600" dirty="0">
+                <a:latin typeface="Times New Roman" panose="02020603050405020304" pitchFamily="18" charset="0"/>
+              </a:endParaRPr>
+            </a:p>
+          </p:txBody>
+        </p:sp>
+      </p:grpSp>
+      <p:grpSp>
+        <p:nvGrpSpPr>
+          <p:cNvPr id="7" name="Group 6">
+            <a:extLst>
+              <a:ext uri="{FF2B5EF4-FFF2-40B4-BE49-F238E27FC236}">
+                <a16:creationId xmlns:a16="http://schemas.microsoft.com/office/drawing/2014/main" id="{266965FD-4538-4CE4-879B-C94D648E3772}"/>
+              </a:ext>
+            </a:extLst>
+          </p:cNvPr>
+          <p:cNvGrpSpPr/>
+          <p:nvPr/>
+        </p:nvGrpSpPr>
+        <p:grpSpPr>
+          <a:xfrm>
+            <a:off x="1979712" y="2923272"/>
+            <a:ext cx="2317245" cy="338554"/>
+            <a:chOff x="1979712" y="2923272"/>
+            <a:chExt cx="2317245" cy="338554"/>
+          </a:xfrm>
+        </p:grpSpPr>
+        <p:sp>
+          <p:nvSpPr>
+            <p:cNvPr id="27" name="TextBox 26"/>
+            <p:cNvSpPr txBox="1"/>
+            <p:nvPr/>
+          </p:nvSpPr>
+          <p:spPr>
+            <a:xfrm>
+              <a:off x="3717952" y="2923272"/>
+              <a:ext cx="579005" cy="338554"/>
+            </a:xfrm>
+            <a:prstGeom prst="rect">
+              <a:avLst/>
+            </a:prstGeom>
+            <a:noFill/>
+          </p:spPr>
+          <p:txBody>
+            <a:bodyPr wrap="none" rtlCol="0">
+              <a:spAutoFit/>
+            </a:bodyPr>
+            <a:lstStyle/>
+            <a:p>
+              <a:r>
+                <a:rPr lang="en-US" sz="1600" dirty="0">
+                  <a:latin typeface="Times New Roman" panose="02020603050405020304" pitchFamily="18" charset="0"/>
+                </a:rPr>
+                <a:t>(2,2)</a:t>
+              </a:r>
+              <a:endParaRPr lang="fr-FR" sz="1600" dirty="0">
+                <a:latin typeface="Times New Roman" panose="02020603050405020304" pitchFamily="18" charset="0"/>
+              </a:endParaRPr>
+            </a:p>
+          </p:txBody>
+        </p:sp>
+        <p:sp>
+          <p:nvSpPr>
+            <p:cNvPr id="20" name="TextBox 19">
+              <a:extLst>
+                <a:ext uri="{FF2B5EF4-FFF2-40B4-BE49-F238E27FC236}">
+                  <a16:creationId xmlns:a16="http://schemas.microsoft.com/office/drawing/2014/main" id="{4FDAFBA1-F4C2-46BF-8AE1-6531B9F12F74}"/>
+                </a:ext>
+              </a:extLst>
+            </p:cNvPr>
+            <p:cNvSpPr txBox="1"/>
+            <p:nvPr/>
+          </p:nvSpPr>
+          <p:spPr>
+            <a:xfrm>
+              <a:off x="2915816" y="2923272"/>
+              <a:ext cx="579005" cy="338554"/>
+            </a:xfrm>
+            <a:prstGeom prst="rect">
+              <a:avLst/>
+            </a:prstGeom>
+            <a:noFill/>
+          </p:spPr>
+          <p:txBody>
+            <a:bodyPr wrap="none" rtlCol="0">
+              <a:spAutoFit/>
+            </a:bodyPr>
+            <a:lstStyle/>
+            <a:p>
+              <a:r>
+                <a:rPr lang="en-US" sz="1600" dirty="0">
+                  <a:latin typeface="Times New Roman" panose="02020603050405020304" pitchFamily="18" charset="0"/>
+                </a:rPr>
+                <a:t>(1,2)</a:t>
+              </a:r>
+              <a:endParaRPr lang="fr-FR" sz="1600" dirty="0">
+                <a:latin typeface="Times New Roman" panose="02020603050405020304" pitchFamily="18" charset="0"/>
+              </a:endParaRPr>
+            </a:p>
+          </p:txBody>
+        </p:sp>
+        <p:sp>
+          <p:nvSpPr>
+            <p:cNvPr id="46" name="TextBox 45">
+              <a:extLst>
+                <a:ext uri="{FF2B5EF4-FFF2-40B4-BE49-F238E27FC236}">
+                  <a16:creationId xmlns:a16="http://schemas.microsoft.com/office/drawing/2014/main" id="{CDDDD13F-1557-4DF9-94D0-28687534F3F3}"/>
+                </a:ext>
+              </a:extLst>
+            </p:cNvPr>
+            <p:cNvSpPr txBox="1"/>
+            <p:nvPr/>
+          </p:nvSpPr>
+          <p:spPr>
+            <a:xfrm>
+              <a:off x="1979712" y="2923272"/>
+              <a:ext cx="579005" cy="338554"/>
+            </a:xfrm>
+            <a:prstGeom prst="rect">
+              <a:avLst/>
+            </a:prstGeom>
+            <a:noFill/>
+          </p:spPr>
+          <p:txBody>
+            <a:bodyPr wrap="none" rtlCol="0">
+              <a:spAutoFit/>
+            </a:bodyPr>
+            <a:lstStyle/>
+            <a:p>
+              <a:r>
+                <a:rPr lang="en-US" sz="1600" dirty="0">
+                  <a:latin typeface="Times New Roman" panose="02020603050405020304" pitchFamily="18" charset="0"/>
+                </a:rPr>
+                <a:t>(0,2)</a:t>
+              </a:r>
+              <a:endParaRPr lang="fr-FR" sz="1600" dirty="0">
+                <a:latin typeface="Times New Roman" panose="02020603050405020304" pitchFamily="18" charset="0"/>
+              </a:endParaRPr>
+            </a:p>
+          </p:txBody>
+        </p:sp>
+      </p:grpSp>
+      <p:grpSp>
+        <p:nvGrpSpPr>
+          <p:cNvPr id="2" name="Group 1">
+            <a:extLst>
+              <a:ext uri="{FF2B5EF4-FFF2-40B4-BE49-F238E27FC236}">
+                <a16:creationId xmlns:a16="http://schemas.microsoft.com/office/drawing/2014/main" id="{B84A9D63-017D-4A4E-9472-5E0C03206C2A}"/>
+              </a:ext>
+            </a:extLst>
+          </p:cNvPr>
+          <p:cNvGrpSpPr/>
+          <p:nvPr/>
+        </p:nvGrpSpPr>
+        <p:grpSpPr>
+          <a:xfrm>
+            <a:off x="2071816" y="4581128"/>
+            <a:ext cx="2860224" cy="338554"/>
+            <a:chOff x="2071816" y="4643844"/>
+            <a:chExt cx="2860224" cy="338554"/>
+          </a:xfrm>
+        </p:grpSpPr>
+        <p:cxnSp>
+          <p:nvCxnSpPr>
+            <p:cNvPr id="18" name="Straight Arrow Connector 17"/>
+            <p:cNvCxnSpPr>
+              <a:cxnSpLocks/>
+            </p:cNvCxnSpPr>
+            <p:nvPr/>
+          </p:nvCxnSpPr>
+          <p:spPr>
+            <a:xfrm>
+              <a:off x="2620311" y="4643844"/>
+              <a:ext cx="2311729" cy="0"/>
+            </a:xfrm>
+            <a:prstGeom prst="straightConnector1">
+              <a:avLst/>
+            </a:prstGeom>
+            <a:ln>
+              <a:solidFill>
+                <a:schemeClr val="tx1"/>
+              </a:solidFill>
+              <a:tailEnd type="arrow"/>
+            </a:ln>
+          </p:spPr>
+          <p:style>
+            <a:lnRef idx="1">
+              <a:schemeClr val="accent1"/>
+            </a:lnRef>
+            <a:fillRef idx="0">
+              <a:schemeClr val="accent1"/>
+            </a:fillRef>
+            <a:effectRef idx="0">
+              <a:schemeClr val="accent1"/>
+            </a:effectRef>
+            <a:fontRef idx="minor">
+              <a:schemeClr val="tx1"/>
+            </a:fontRef>
+          </p:style>
+        </p:cxnSp>
+        <p:sp>
+          <p:nvSpPr>
+            <p:cNvPr id="22" name="TextBox 21"/>
+            <p:cNvSpPr txBox="1"/>
+            <p:nvPr/>
+          </p:nvSpPr>
+          <p:spPr>
+            <a:xfrm>
+              <a:off x="2071816" y="4643844"/>
+              <a:ext cx="704524" cy="338554"/>
+            </a:xfrm>
+            <a:prstGeom prst="rect">
+              <a:avLst/>
+            </a:prstGeom>
+            <a:noFill/>
+          </p:spPr>
+          <p:txBody>
+            <a:bodyPr wrap="square" rtlCol="0">
+              <a:spAutoFit/>
+            </a:bodyPr>
+            <a:lstStyle/>
+            <a:p>
+              <a:r>
+                <a:rPr lang="en-US" sz="1600" dirty="0">
+                  <a:latin typeface="Times New Roman" panose="02020603050405020304" pitchFamily="18" charset="0"/>
+                </a:rPr>
+                <a:t>(0,0)</a:t>
+              </a:r>
+              <a:endParaRPr lang="fr-FR" sz="1600" dirty="0">
+                <a:latin typeface="Times New Roman" panose="02020603050405020304" pitchFamily="18" charset="0"/>
+              </a:endParaRPr>
+            </a:p>
+          </p:txBody>
+        </p:sp>
+        <p:sp>
+          <p:nvSpPr>
+            <p:cNvPr id="23" name="TextBox 22"/>
+            <p:cNvSpPr txBox="1"/>
+            <p:nvPr/>
+          </p:nvSpPr>
+          <p:spPr>
+            <a:xfrm>
+              <a:off x="3742946" y="4643844"/>
+              <a:ext cx="579005" cy="338554"/>
+            </a:xfrm>
+            <a:prstGeom prst="rect">
+              <a:avLst/>
+            </a:prstGeom>
+            <a:noFill/>
+          </p:spPr>
+          <p:txBody>
+            <a:bodyPr wrap="none" rtlCol="0">
+              <a:spAutoFit/>
+            </a:bodyPr>
+            <a:lstStyle/>
+            <a:p>
+              <a:r>
+                <a:rPr lang="en-US" sz="1600" dirty="0">
+                  <a:latin typeface="Times New Roman" panose="02020603050405020304" pitchFamily="18" charset="0"/>
+                </a:rPr>
+                <a:t>(2,0)</a:t>
+              </a:r>
+              <a:endParaRPr lang="fr-FR" sz="1600" dirty="0">
+                <a:latin typeface="Times New Roman" panose="02020603050405020304" pitchFamily="18" charset="0"/>
+              </a:endParaRPr>
+            </a:p>
+          </p:txBody>
+        </p:sp>
+        <p:sp>
+          <p:nvSpPr>
+            <p:cNvPr id="26" name="TextBox 25"/>
+            <p:cNvSpPr txBox="1"/>
+            <p:nvPr/>
+          </p:nvSpPr>
+          <p:spPr>
+            <a:xfrm>
+              <a:off x="2925254" y="4643844"/>
+              <a:ext cx="579005" cy="338554"/>
+            </a:xfrm>
+            <a:prstGeom prst="rect">
+              <a:avLst/>
+            </a:prstGeom>
+            <a:noFill/>
+          </p:spPr>
+          <p:txBody>
+            <a:bodyPr wrap="none" rtlCol="0">
+              <a:spAutoFit/>
+            </a:bodyPr>
+            <a:lstStyle/>
+            <a:p>
+              <a:r>
+                <a:rPr lang="en-US" sz="1600" dirty="0">
+                  <a:latin typeface="Times New Roman" panose="02020603050405020304" pitchFamily="18" charset="0"/>
+                </a:rPr>
+                <a:t>(1,0)</a:t>
+              </a:r>
+              <a:endParaRPr lang="fr-FR" sz="1600" dirty="0">
+                <a:latin typeface="Times New Roman" panose="02020603050405020304" pitchFamily="18" charset="0"/>
+              </a:endParaRPr>
+            </a:p>
+          </p:txBody>
+        </p:sp>
+      </p:grpSp>
+      <p:sp>
+        <p:nvSpPr>
+          <p:cNvPr id="4" name="TextBox 3"/>
+          <p:cNvSpPr txBox="1"/>
+          <p:nvPr/>
+        </p:nvSpPr>
+        <p:spPr>
+          <a:xfrm>
+            <a:off x="2421808" y="3765187"/>
+            <a:ext cx="396262" cy="1107996"/>
+          </a:xfrm>
+          <a:prstGeom prst="rect">
+            <a:avLst/>
+          </a:prstGeom>
+          <a:noFill/>
+        </p:spPr>
+        <p:txBody>
+          <a:bodyPr wrap="none" rtlCol="0">
+            <a:spAutoFit/>
+          </a:bodyPr>
+          <a:lstStyle/>
+          <a:p>
+            <a:r>
+              <a:rPr lang="en-US" sz="6600" dirty="0">
+                <a:latin typeface="Times New Roman" panose="02020603050405020304" pitchFamily="18" charset="0"/>
+              </a:rPr>
+              <a:t>.</a:t>
+            </a:r>
+            <a:endParaRPr lang="fr-FR" sz="1600" dirty="0">
+              <a:latin typeface="Times New Roman" panose="02020603050405020304" pitchFamily="18" charset="0"/>
+            </a:endParaRPr>
+          </a:p>
+        </p:txBody>
+      </p:sp>
+      <p:sp>
+        <p:nvSpPr>
+          <p:cNvPr id="11" name="TextBox 10"/>
+          <p:cNvSpPr txBox="1"/>
+          <p:nvPr/>
+        </p:nvSpPr>
+        <p:spPr>
+          <a:xfrm>
+            <a:off x="4087914" y="3765187"/>
+            <a:ext cx="396262" cy="1107996"/>
+          </a:xfrm>
+          <a:prstGeom prst="rect">
+            <a:avLst/>
+          </a:prstGeom>
+          <a:noFill/>
+        </p:spPr>
+        <p:txBody>
+          <a:bodyPr wrap="none" rtlCol="0">
+            <a:spAutoFit/>
+          </a:bodyPr>
+          <a:lstStyle/>
+          <a:p>
+            <a:r>
+              <a:rPr lang="en-US" sz="6600" dirty="0">
+                <a:latin typeface="Times New Roman" panose="02020603050405020304" pitchFamily="18" charset="0"/>
+              </a:rPr>
+              <a:t>.</a:t>
+            </a:r>
+            <a:endParaRPr lang="fr-FR" sz="1600" dirty="0">
+              <a:latin typeface="Times New Roman" panose="02020603050405020304" pitchFamily="18" charset="0"/>
+            </a:endParaRPr>
+          </a:p>
+        </p:txBody>
+      </p:sp>
+      <p:sp>
+        <p:nvSpPr>
+          <p:cNvPr id="15" name="TextBox 14"/>
+          <p:cNvSpPr txBox="1"/>
+          <p:nvPr/>
+        </p:nvSpPr>
+        <p:spPr>
+          <a:xfrm>
+            <a:off x="3257330" y="3765187"/>
+            <a:ext cx="396262" cy="1107996"/>
+          </a:xfrm>
+          <a:prstGeom prst="rect">
+            <a:avLst/>
+          </a:prstGeom>
+          <a:noFill/>
+        </p:spPr>
+        <p:txBody>
+          <a:bodyPr wrap="none" rtlCol="0">
+            <a:spAutoFit/>
+          </a:bodyPr>
+          <a:lstStyle/>
+          <a:p>
+            <a:r>
+              <a:rPr lang="en-US" sz="6600" dirty="0">
+                <a:latin typeface="Times New Roman" panose="02020603050405020304" pitchFamily="18" charset="0"/>
+              </a:rPr>
+              <a:t>.</a:t>
+            </a:r>
+            <a:endParaRPr lang="fr-FR" sz="1600" dirty="0">
+              <a:latin typeface="Times New Roman" panose="02020603050405020304" pitchFamily="18" charset="0"/>
+            </a:endParaRPr>
+          </a:p>
+        </p:txBody>
+      </p:sp>
+      <p:cxnSp>
+        <p:nvCxnSpPr>
+          <p:cNvPr id="19" name="Straight Arrow Connector 18"/>
+          <p:cNvCxnSpPr/>
+          <p:nvPr/>
+        </p:nvCxnSpPr>
+        <p:spPr>
+          <a:xfrm flipV="1">
+            <a:off x="2607688" y="2420888"/>
+            <a:ext cx="2575" cy="2302592"/>
+          </a:xfrm>
+          <a:prstGeom prst="straightConnector1">
+            <a:avLst/>
+          </a:prstGeom>
+          <a:ln>
+            <a:solidFill>
+              <a:schemeClr val="tx1"/>
+            </a:solidFill>
+            <a:tailEnd type="arrow"/>
+          </a:ln>
+        </p:spPr>
+        <p:style>
+          <a:lnRef idx="1">
+            <a:schemeClr val="accent1"/>
+          </a:lnRef>
+          <a:fillRef idx="0">
+            <a:schemeClr val="accent1"/>
+          </a:fillRef>
+          <a:effectRef idx="0">
+            <a:schemeClr val="accent1"/>
+          </a:effectRef>
+          <a:fontRef idx="minor">
+            <a:schemeClr val="tx1"/>
+          </a:fontRef>
+        </p:style>
+      </p:cxnSp>
+      <p:sp>
+        <p:nvSpPr>
+          <p:cNvPr id="29" name="TextBox 28"/>
+          <p:cNvSpPr txBox="1"/>
+          <p:nvPr/>
+        </p:nvSpPr>
+        <p:spPr>
+          <a:xfrm>
+            <a:off x="4860032" y="4509120"/>
+            <a:ext cx="819455" cy="338554"/>
+          </a:xfrm>
+          <a:prstGeom prst="rect">
+            <a:avLst/>
+          </a:prstGeom>
+          <a:noFill/>
+        </p:spPr>
+        <p:txBody>
+          <a:bodyPr wrap="none" rtlCol="0">
+            <a:spAutoFit/>
+          </a:bodyPr>
+          <a:lstStyle/>
+          <a:p>
+            <a:r>
+              <a:rPr lang="en-US" sz="1600" i="1" dirty="0" err="1">
+                <a:latin typeface="Times New Roman" panose="02020603050405020304" pitchFamily="18" charset="0"/>
+              </a:rPr>
+              <a:t>i</a:t>
+            </a:r>
+            <a:r>
+              <a:rPr lang="en-US" sz="1600" dirty="0">
+                <a:latin typeface="Times New Roman" panose="02020603050405020304" pitchFamily="18" charset="0"/>
+              </a:rPr>
+              <a:t> values</a:t>
+            </a:r>
+            <a:endParaRPr lang="fr-FR" sz="1600" i="1" dirty="0">
+              <a:latin typeface="Times New Roman" panose="02020603050405020304" pitchFamily="18" charset="0"/>
+            </a:endParaRPr>
+          </a:p>
+        </p:txBody>
+      </p:sp>
+      <p:sp>
+        <p:nvSpPr>
+          <p:cNvPr id="30" name="TextBox 29"/>
+          <p:cNvSpPr txBox="1"/>
+          <p:nvPr/>
+        </p:nvSpPr>
+        <p:spPr>
+          <a:xfrm>
+            <a:off x="1619672" y="3275692"/>
+            <a:ext cx="819455" cy="338554"/>
+          </a:xfrm>
+          <a:prstGeom prst="rect">
+            <a:avLst/>
+          </a:prstGeom>
+          <a:noFill/>
+        </p:spPr>
+        <p:txBody>
+          <a:bodyPr wrap="none" rtlCol="0">
+            <a:spAutoFit/>
+          </a:bodyPr>
+          <a:lstStyle/>
+          <a:p>
+            <a:r>
+              <a:rPr lang="en-US" sz="1600" i="1" dirty="0">
+                <a:latin typeface="Times New Roman" panose="02020603050405020304" pitchFamily="18" charset="0"/>
+              </a:rPr>
+              <a:t>j</a:t>
+            </a:r>
+            <a:r>
+              <a:rPr lang="en-US" sz="1600" dirty="0">
+                <a:latin typeface="Times New Roman" panose="02020603050405020304" pitchFamily="18" charset="0"/>
+              </a:rPr>
+              <a:t> values</a:t>
+            </a:r>
+            <a:endParaRPr lang="fr-FR" sz="1600" i="1" dirty="0">
+              <a:latin typeface="Times New Roman" panose="02020603050405020304" pitchFamily="18" charset="0"/>
+            </a:endParaRPr>
+          </a:p>
+        </p:txBody>
+      </p:sp>
+      <p:grpSp>
+        <p:nvGrpSpPr>
+          <p:cNvPr id="13" name="Group 12">
+            <a:extLst>
+              <a:ext uri="{FF2B5EF4-FFF2-40B4-BE49-F238E27FC236}">
+                <a16:creationId xmlns:a16="http://schemas.microsoft.com/office/drawing/2014/main" id="{006D1090-6828-449F-81CB-035CBB7917E4}"/>
+              </a:ext>
+            </a:extLst>
+          </p:cNvPr>
+          <p:cNvGrpSpPr/>
+          <p:nvPr/>
+        </p:nvGrpSpPr>
+        <p:grpSpPr>
+          <a:xfrm>
+            <a:off x="2411760" y="2971196"/>
+            <a:ext cx="2072416" cy="1107996"/>
+            <a:chOff x="2411760" y="2971196"/>
+            <a:chExt cx="2072416" cy="1107996"/>
+          </a:xfrm>
+        </p:grpSpPr>
+        <p:sp>
+          <p:nvSpPr>
+            <p:cNvPr id="12" name="TextBox 11"/>
+            <p:cNvSpPr txBox="1"/>
+            <p:nvPr/>
+          </p:nvSpPr>
+          <p:spPr>
+            <a:xfrm>
+              <a:off x="3247282" y="2971196"/>
+              <a:ext cx="396262" cy="1107996"/>
+            </a:xfrm>
+            <a:prstGeom prst="rect">
+              <a:avLst/>
+            </a:prstGeom>
+            <a:noFill/>
+          </p:spPr>
+          <p:txBody>
+            <a:bodyPr wrap="none" rtlCol="0">
+              <a:spAutoFit/>
+            </a:bodyPr>
+            <a:lstStyle/>
+            <a:p>
+              <a:r>
+                <a:rPr lang="en-US" sz="6600" dirty="0">
+                  <a:latin typeface="Times New Roman" panose="02020603050405020304" pitchFamily="18" charset="0"/>
+                </a:rPr>
+                <a:t>.</a:t>
+              </a:r>
+              <a:endParaRPr lang="fr-FR" sz="1600" dirty="0">
+                <a:latin typeface="Times New Roman" panose="02020603050405020304" pitchFamily="18" charset="0"/>
+              </a:endParaRPr>
+            </a:p>
+          </p:txBody>
+        </p:sp>
+        <p:sp>
+          <p:nvSpPr>
+            <p:cNvPr id="14" name="TextBox 13"/>
+            <p:cNvSpPr txBox="1"/>
+            <p:nvPr/>
+          </p:nvSpPr>
+          <p:spPr>
+            <a:xfrm>
+              <a:off x="4087914" y="2971196"/>
+              <a:ext cx="396262" cy="1107996"/>
+            </a:xfrm>
+            <a:prstGeom prst="rect">
+              <a:avLst/>
+            </a:prstGeom>
+            <a:noFill/>
+          </p:spPr>
+          <p:txBody>
+            <a:bodyPr wrap="none" rtlCol="0">
+              <a:spAutoFit/>
+            </a:bodyPr>
+            <a:lstStyle/>
+            <a:p>
+              <a:r>
+                <a:rPr lang="en-US" sz="6600" dirty="0">
+                  <a:latin typeface="Times New Roman" panose="02020603050405020304" pitchFamily="18" charset="0"/>
+                </a:rPr>
+                <a:t>.</a:t>
+              </a:r>
+              <a:endParaRPr lang="fr-FR" sz="1600" dirty="0">
+                <a:latin typeface="Times New Roman" panose="02020603050405020304" pitchFamily="18" charset="0"/>
+              </a:endParaRPr>
+            </a:p>
+          </p:txBody>
+        </p:sp>
+        <p:sp>
+          <p:nvSpPr>
+            <p:cNvPr id="31" name="TextBox 30">
+              <a:extLst>
+                <a:ext uri="{FF2B5EF4-FFF2-40B4-BE49-F238E27FC236}">
+                  <a16:creationId xmlns:a16="http://schemas.microsoft.com/office/drawing/2014/main" id="{A981AD8D-47DE-4C4A-9A9B-77DB7B8E0A25}"/>
+                </a:ext>
+              </a:extLst>
+            </p:cNvPr>
+            <p:cNvSpPr txBox="1"/>
+            <p:nvPr/>
+          </p:nvSpPr>
+          <p:spPr>
+            <a:xfrm>
+              <a:off x="2411760" y="2971196"/>
+              <a:ext cx="396262" cy="1107996"/>
+            </a:xfrm>
+            <a:prstGeom prst="rect">
+              <a:avLst/>
+            </a:prstGeom>
+            <a:noFill/>
+          </p:spPr>
+          <p:txBody>
+            <a:bodyPr wrap="none" rtlCol="0">
+              <a:spAutoFit/>
+            </a:bodyPr>
+            <a:lstStyle/>
+            <a:p>
+              <a:r>
+                <a:rPr lang="en-US" sz="6600" dirty="0">
+                  <a:latin typeface="Times New Roman" panose="02020603050405020304" pitchFamily="18" charset="0"/>
+                </a:rPr>
+                <a:t>.</a:t>
+              </a:r>
+              <a:endParaRPr lang="fr-FR" sz="1600" dirty="0">
+                <a:latin typeface="Times New Roman" panose="02020603050405020304" pitchFamily="18" charset="0"/>
+              </a:endParaRPr>
+            </a:p>
+          </p:txBody>
+        </p:sp>
+      </p:grpSp>
+      <p:grpSp>
+        <p:nvGrpSpPr>
+          <p:cNvPr id="10" name="Group 9">
+            <a:extLst>
+              <a:ext uri="{FF2B5EF4-FFF2-40B4-BE49-F238E27FC236}">
+                <a16:creationId xmlns:a16="http://schemas.microsoft.com/office/drawing/2014/main" id="{0BA73EA2-A088-47DC-8C8D-3D6AE2D60737}"/>
+              </a:ext>
+            </a:extLst>
+          </p:cNvPr>
+          <p:cNvGrpSpPr/>
+          <p:nvPr/>
+        </p:nvGrpSpPr>
+        <p:grpSpPr>
+          <a:xfrm>
+            <a:off x="2411760" y="2080944"/>
+            <a:ext cx="2072416" cy="1107996"/>
+            <a:chOff x="2411760" y="2080944"/>
+            <a:chExt cx="2072416" cy="1107996"/>
+          </a:xfrm>
+        </p:grpSpPr>
+        <p:sp>
+          <p:nvSpPr>
+            <p:cNvPr id="16" name="TextBox 15"/>
+            <p:cNvSpPr txBox="1"/>
+            <p:nvPr/>
+          </p:nvSpPr>
+          <p:spPr>
+            <a:xfrm>
+              <a:off x="4087914" y="2080944"/>
+              <a:ext cx="396262" cy="1107996"/>
+            </a:xfrm>
+            <a:prstGeom prst="rect">
+              <a:avLst/>
+            </a:prstGeom>
+            <a:noFill/>
+          </p:spPr>
+          <p:txBody>
+            <a:bodyPr wrap="none" rtlCol="0">
+              <a:spAutoFit/>
+            </a:bodyPr>
+            <a:lstStyle/>
+            <a:p>
+              <a:r>
+                <a:rPr lang="en-US" sz="6600" dirty="0">
+                  <a:latin typeface="Times New Roman" panose="02020603050405020304" pitchFamily="18" charset="0"/>
+                </a:rPr>
+                <a:t>.</a:t>
+              </a:r>
+              <a:endParaRPr lang="fr-FR" sz="1600" dirty="0">
+                <a:latin typeface="Times New Roman" panose="02020603050405020304" pitchFamily="18" charset="0"/>
+              </a:endParaRPr>
+            </a:p>
+          </p:txBody>
+        </p:sp>
+        <p:sp>
+          <p:nvSpPr>
+            <p:cNvPr id="21" name="TextBox 20">
+              <a:extLst>
+                <a:ext uri="{FF2B5EF4-FFF2-40B4-BE49-F238E27FC236}">
+                  <a16:creationId xmlns:a16="http://schemas.microsoft.com/office/drawing/2014/main" id="{776A97C2-A39C-4E74-84E2-47F8103412B4}"/>
+                </a:ext>
+              </a:extLst>
+            </p:cNvPr>
+            <p:cNvSpPr txBox="1"/>
+            <p:nvPr/>
+          </p:nvSpPr>
+          <p:spPr>
+            <a:xfrm>
+              <a:off x="3203848" y="2080944"/>
+              <a:ext cx="396262" cy="1107996"/>
+            </a:xfrm>
+            <a:prstGeom prst="rect">
+              <a:avLst/>
+            </a:prstGeom>
+            <a:noFill/>
+          </p:spPr>
+          <p:txBody>
+            <a:bodyPr wrap="none" rtlCol="0">
+              <a:spAutoFit/>
+            </a:bodyPr>
+            <a:lstStyle/>
+            <a:p>
+              <a:r>
+                <a:rPr lang="en-US" sz="6600" dirty="0">
+                  <a:latin typeface="Times New Roman" panose="02020603050405020304" pitchFamily="18" charset="0"/>
+                </a:rPr>
+                <a:t>.</a:t>
+              </a:r>
+              <a:endParaRPr lang="fr-FR" sz="1600" dirty="0">
+                <a:latin typeface="Times New Roman" panose="02020603050405020304" pitchFamily="18" charset="0"/>
+              </a:endParaRPr>
+            </a:p>
+          </p:txBody>
+        </p:sp>
+        <p:sp>
+          <p:nvSpPr>
+            <p:cNvPr id="28" name="TextBox 27">
+              <a:extLst>
+                <a:ext uri="{FF2B5EF4-FFF2-40B4-BE49-F238E27FC236}">
+                  <a16:creationId xmlns:a16="http://schemas.microsoft.com/office/drawing/2014/main" id="{B933EF64-8C2E-46B2-81E1-1E24A0D7C483}"/>
+                </a:ext>
+              </a:extLst>
+            </p:cNvPr>
+            <p:cNvSpPr txBox="1"/>
+            <p:nvPr/>
+          </p:nvSpPr>
+          <p:spPr>
+            <a:xfrm>
+              <a:off x="2411760" y="2080944"/>
+              <a:ext cx="396262" cy="1107996"/>
+            </a:xfrm>
+            <a:prstGeom prst="rect">
+              <a:avLst/>
+            </a:prstGeom>
+            <a:noFill/>
+          </p:spPr>
+          <p:txBody>
+            <a:bodyPr wrap="none" rtlCol="0">
+              <a:spAutoFit/>
+            </a:bodyPr>
+            <a:lstStyle/>
+            <a:p>
+              <a:r>
+                <a:rPr lang="en-US" sz="6600" dirty="0">
+                  <a:latin typeface="Times New Roman" panose="02020603050405020304" pitchFamily="18" charset="0"/>
+                </a:rPr>
+                <a:t>.</a:t>
+              </a:r>
+              <a:endParaRPr lang="fr-FR" sz="1600" dirty="0">
+                <a:latin typeface="Times New Roman" panose="02020603050405020304" pitchFamily="18" charset="0"/>
+              </a:endParaRPr>
+            </a:p>
+          </p:txBody>
+        </p:sp>
+      </p:grpSp>
+      <p:cxnSp>
+        <p:nvCxnSpPr>
+          <p:cNvPr id="48" name="Straight Connector 47">
+            <a:extLst>
+              <a:ext uri="{FF2B5EF4-FFF2-40B4-BE49-F238E27FC236}">
+                <a16:creationId xmlns:a16="http://schemas.microsoft.com/office/drawing/2014/main" id="{78D8B7A1-7DEA-4E00-A4E6-47902931660F}"/>
+              </a:ext>
+            </a:extLst>
+          </p:cNvPr>
+          <p:cNvCxnSpPr>
+            <a:cxnSpLocks/>
+          </p:cNvCxnSpPr>
+          <p:nvPr/>
+        </p:nvCxnSpPr>
+        <p:spPr>
+          <a:xfrm flipV="1">
+            <a:off x="2556703" y="2889897"/>
+            <a:ext cx="1749730" cy="1745996"/>
+          </a:xfrm>
+          <a:prstGeom prst="line">
+            <a:avLst/>
+          </a:prstGeom>
+          <a:ln w="19050">
+            <a:prstDash val="dash"/>
+          </a:ln>
+        </p:spPr>
+        <p:style>
+          <a:lnRef idx="1">
+            <a:schemeClr val="accent1"/>
+          </a:lnRef>
+          <a:fillRef idx="0">
+            <a:schemeClr val="accent1"/>
+          </a:fillRef>
+          <a:effectRef idx="0">
+            <a:schemeClr val="accent1"/>
+          </a:effectRef>
+          <a:fontRef idx="minor">
+            <a:schemeClr val="tx1"/>
+          </a:fontRef>
+        </p:style>
+      </p:cxnSp>
+      <p:cxnSp>
+        <p:nvCxnSpPr>
+          <p:cNvPr id="50" name="Straight Connector 49">
+            <a:extLst>
+              <a:ext uri="{FF2B5EF4-FFF2-40B4-BE49-F238E27FC236}">
+                <a16:creationId xmlns:a16="http://schemas.microsoft.com/office/drawing/2014/main" id="{58DBD085-9322-4CBC-9056-728664FC4E10}"/>
+              </a:ext>
+            </a:extLst>
+          </p:cNvPr>
+          <p:cNvCxnSpPr>
+            <a:cxnSpLocks/>
+          </p:cNvCxnSpPr>
+          <p:nvPr/>
+        </p:nvCxnSpPr>
+        <p:spPr>
+          <a:xfrm flipV="1">
+            <a:off x="3356771" y="3724024"/>
+            <a:ext cx="988424" cy="976808"/>
+          </a:xfrm>
+          <a:prstGeom prst="line">
+            <a:avLst/>
+          </a:prstGeom>
+          <a:ln w="19050">
+            <a:prstDash val="dash"/>
+          </a:ln>
+        </p:spPr>
+        <p:style>
+          <a:lnRef idx="1">
+            <a:schemeClr val="accent1"/>
+          </a:lnRef>
+          <a:fillRef idx="0">
+            <a:schemeClr val="accent1"/>
+          </a:fillRef>
+          <a:effectRef idx="0">
+            <a:schemeClr val="accent1"/>
+          </a:effectRef>
+          <a:fontRef idx="minor">
+            <a:schemeClr val="tx1"/>
+          </a:fontRef>
+        </p:style>
+      </p:cxnSp>
+      <p:cxnSp>
+        <p:nvCxnSpPr>
+          <p:cNvPr id="53" name="Straight Connector 52">
+            <a:extLst>
+              <a:ext uri="{FF2B5EF4-FFF2-40B4-BE49-F238E27FC236}">
+                <a16:creationId xmlns:a16="http://schemas.microsoft.com/office/drawing/2014/main" id="{CA75829B-EE47-4CA9-9C89-ADC1AAF01FE9}"/>
+              </a:ext>
+            </a:extLst>
+          </p:cNvPr>
+          <p:cNvCxnSpPr>
+            <a:cxnSpLocks/>
+          </p:cNvCxnSpPr>
+          <p:nvPr/>
+        </p:nvCxnSpPr>
+        <p:spPr>
+          <a:xfrm flipV="1">
+            <a:off x="2595959" y="2855686"/>
+            <a:ext cx="853079" cy="948316"/>
+          </a:xfrm>
+          <a:prstGeom prst="line">
+            <a:avLst/>
+          </a:prstGeom>
+          <a:ln w="19050">
+            <a:prstDash val="dash"/>
+          </a:ln>
+        </p:spPr>
+        <p:style>
+          <a:lnRef idx="1">
+            <a:schemeClr val="accent1"/>
+          </a:lnRef>
+          <a:fillRef idx="0">
+            <a:schemeClr val="accent1"/>
+          </a:fillRef>
+          <a:effectRef idx="0">
+            <a:schemeClr val="accent1"/>
+          </a:effectRef>
+          <a:fontRef idx="minor">
+            <a:schemeClr val="tx1"/>
+          </a:fontRef>
+        </p:style>
+      </p:cxnSp>
+      <mc:AlternateContent xmlns:mc="http://schemas.openxmlformats.org/markup-compatibility/2006">
+        <mc:Choice xmlns:a14="http://schemas.microsoft.com/office/drawing/2010/main" Requires="a14">
+          <p:sp>
+            <p:nvSpPr>
+              <p:cNvPr id="64" name="TextBox 63">
+                <a:extLst>
+                  <a:ext uri="{FF2B5EF4-FFF2-40B4-BE49-F238E27FC236}">
+                    <a16:creationId xmlns:a16="http://schemas.microsoft.com/office/drawing/2014/main" id="{E5F29F08-BE90-4DA0-80A3-697F86A85E51}"/>
+                  </a:ext>
+                </a:extLst>
+              </p:cNvPr>
+              <p:cNvSpPr txBox="1"/>
+              <p:nvPr/>
+            </p:nvSpPr>
+            <p:spPr>
+              <a:xfrm>
+                <a:off x="4263507" y="4292183"/>
+                <a:ext cx="901978" cy="307777"/>
+              </a:xfrm>
+              <a:prstGeom prst="rect">
+                <a:avLst/>
+              </a:prstGeom>
+              <a:noFill/>
+            </p:spPr>
+            <p:txBody>
+              <a:bodyPr wrap="none" rtlCol="0">
+                <a:spAutoFit/>
+              </a:bodyPr>
+              <a:lstStyle/>
+              <a:p>
+                <a14:m>
+                  <m:oMathPara xmlns:m="http://schemas.openxmlformats.org/officeDocument/2006/math">
+                    <m:oMathParaPr>
+                      <m:jc m:val="centerGroup"/>
+                    </m:oMathParaPr>
+                    <m:oMath xmlns:m="http://schemas.openxmlformats.org/officeDocument/2006/math">
+                      <m:r>
+                        <a:rPr lang="en-US" sz="1400" b="0" i="1" smtClean="0">
+                          <a:latin typeface="Cambria Math" panose="02040503050406030204" pitchFamily="18" charset="0"/>
+                        </a:rPr>
+                        <m:t>𝑖</m:t>
+                      </m:r>
+                      <m:r>
+                        <a:rPr lang="en-US" sz="1400" b="0" i="1" smtClean="0">
+                          <a:latin typeface="Cambria Math" panose="02040503050406030204" pitchFamily="18" charset="0"/>
+                        </a:rPr>
+                        <m:t>−</m:t>
+                      </m:r>
+                      <m:r>
+                        <a:rPr lang="en-US" sz="1400" b="0" i="1" smtClean="0">
+                          <a:latin typeface="Cambria Math" panose="02040503050406030204" pitchFamily="18" charset="0"/>
+                        </a:rPr>
+                        <m:t>𝑗</m:t>
+                      </m:r>
+                      <m:r>
+                        <a:rPr lang="en-US" sz="1400" b="0" i="1" smtClean="0">
+                          <a:latin typeface="Cambria Math" panose="02040503050406030204" pitchFamily="18" charset="0"/>
+                        </a:rPr>
+                        <m:t>=2</m:t>
+                      </m:r>
+                    </m:oMath>
+                  </m:oMathPara>
+                </a14:m>
+                <a:endParaRPr lang="en-US" sz="1600" dirty="0"/>
+              </a:p>
+            </p:txBody>
+          </p:sp>
+        </mc:Choice>
+        <mc:Fallback>
+          <p:sp>
+            <p:nvSpPr>
+              <p:cNvPr id="64" name="TextBox 63">
+                <a:extLst>
+                  <a:ext uri="{FF2B5EF4-FFF2-40B4-BE49-F238E27FC236}">
+                    <a16:creationId xmlns:a16="http://schemas.microsoft.com/office/drawing/2014/main" id="{E5F29F08-BE90-4DA0-80A3-697F86A85E51}"/>
+                  </a:ext>
+                </a:extLst>
+              </p:cNvPr>
+              <p:cNvSpPr txBox="1">
+                <a:spLocks noRot="1" noChangeAspect="1" noMove="1" noResize="1" noEditPoints="1" noAdjustHandles="1" noChangeArrowheads="1" noChangeShapeType="1" noTextEdit="1"/>
+              </p:cNvSpPr>
+              <p:nvPr/>
+            </p:nvSpPr>
+            <p:spPr>
+              <a:xfrm>
+                <a:off x="4263507" y="4292183"/>
+                <a:ext cx="901978" cy="307777"/>
+              </a:xfrm>
+              <a:prstGeom prst="rect">
+                <a:avLst/>
+              </a:prstGeom>
+              <a:blipFill>
+                <a:blip r:embed="rId2"/>
+                <a:stretch>
+                  <a:fillRect b="-5882"/>
+                </a:stretch>
+              </a:blipFill>
+            </p:spPr>
+            <p:txBody>
+              <a:bodyPr/>
+              <a:lstStyle/>
+              <a:p>
+                <a:r>
+                  <a:rPr lang="en-US">
+                    <a:noFill/>
+                  </a:rPr>
+                  <a:t> </a:t>
+                </a:r>
+              </a:p>
+            </p:txBody>
+          </p:sp>
+        </mc:Fallback>
+      </mc:AlternateContent>
+      <mc:AlternateContent xmlns:mc="http://schemas.openxmlformats.org/markup-compatibility/2006">
+        <mc:Choice xmlns:a14="http://schemas.microsoft.com/office/drawing/2010/main" Requires="a14">
+          <p:sp>
+            <p:nvSpPr>
+              <p:cNvPr id="65" name="TextBox 64">
+                <a:extLst>
+                  <a:ext uri="{FF2B5EF4-FFF2-40B4-BE49-F238E27FC236}">
+                    <a16:creationId xmlns:a16="http://schemas.microsoft.com/office/drawing/2014/main" id="{4C23B925-AD64-48AE-9AB9-99D3A08966C9}"/>
+                  </a:ext>
+                </a:extLst>
+              </p:cNvPr>
+              <p:cNvSpPr txBox="1"/>
+              <p:nvPr/>
+            </p:nvSpPr>
+            <p:spPr>
+              <a:xfrm>
+                <a:off x="4283968" y="3573016"/>
+                <a:ext cx="901978" cy="307777"/>
+              </a:xfrm>
+              <a:prstGeom prst="rect">
+                <a:avLst/>
+              </a:prstGeom>
+              <a:noFill/>
+            </p:spPr>
+            <p:txBody>
+              <a:bodyPr wrap="none" rtlCol="0">
+                <a:spAutoFit/>
+              </a:bodyPr>
+              <a:lstStyle/>
+              <a:p>
+                <a14:m>
+                  <m:oMathPara xmlns:m="http://schemas.openxmlformats.org/officeDocument/2006/math">
+                    <m:oMathParaPr>
+                      <m:jc m:val="centerGroup"/>
+                    </m:oMathParaPr>
+                    <m:oMath xmlns:m="http://schemas.openxmlformats.org/officeDocument/2006/math">
+                      <m:r>
+                        <a:rPr lang="en-US" sz="1400" b="0" i="1" smtClean="0">
+                          <a:latin typeface="Cambria Math" panose="02040503050406030204" pitchFamily="18" charset="0"/>
+                        </a:rPr>
+                        <m:t>𝑖</m:t>
+                      </m:r>
+                      <m:r>
+                        <a:rPr lang="en-US" sz="1400" b="0" i="1" smtClean="0">
+                          <a:latin typeface="Cambria Math" panose="02040503050406030204" pitchFamily="18" charset="0"/>
+                        </a:rPr>
+                        <m:t>−</m:t>
+                      </m:r>
+                      <m:r>
+                        <a:rPr lang="en-US" sz="1400" b="0" i="1" smtClean="0">
+                          <a:latin typeface="Cambria Math" panose="02040503050406030204" pitchFamily="18" charset="0"/>
+                        </a:rPr>
+                        <m:t>𝑗</m:t>
+                      </m:r>
+                      <m:r>
+                        <a:rPr lang="en-US" sz="1400" b="0" i="1" smtClean="0">
+                          <a:latin typeface="Cambria Math" panose="02040503050406030204" pitchFamily="18" charset="0"/>
+                        </a:rPr>
+                        <m:t>=1</m:t>
+                      </m:r>
+                    </m:oMath>
+                  </m:oMathPara>
+                </a14:m>
+                <a:endParaRPr lang="en-US" sz="1600" dirty="0"/>
+              </a:p>
+            </p:txBody>
+          </p:sp>
+        </mc:Choice>
+        <mc:Fallback>
+          <p:sp>
+            <p:nvSpPr>
+              <p:cNvPr id="65" name="TextBox 64">
+                <a:extLst>
+                  <a:ext uri="{FF2B5EF4-FFF2-40B4-BE49-F238E27FC236}">
+                    <a16:creationId xmlns:a16="http://schemas.microsoft.com/office/drawing/2014/main" id="{4C23B925-AD64-48AE-9AB9-99D3A08966C9}"/>
+                  </a:ext>
+                </a:extLst>
+              </p:cNvPr>
+              <p:cNvSpPr txBox="1">
+                <a:spLocks noRot="1" noChangeAspect="1" noMove="1" noResize="1" noEditPoints="1" noAdjustHandles="1" noChangeArrowheads="1" noChangeShapeType="1" noTextEdit="1"/>
+              </p:cNvSpPr>
+              <p:nvPr/>
+            </p:nvSpPr>
+            <p:spPr>
+              <a:xfrm>
+                <a:off x="4283968" y="3573016"/>
+                <a:ext cx="901978" cy="307777"/>
+              </a:xfrm>
+              <a:prstGeom prst="rect">
+                <a:avLst/>
+              </a:prstGeom>
+              <a:blipFill>
+                <a:blip r:embed="rId3"/>
+                <a:stretch>
+                  <a:fillRect b="-5882"/>
+                </a:stretch>
+              </a:blipFill>
+            </p:spPr>
+            <p:txBody>
+              <a:bodyPr/>
+              <a:lstStyle/>
+              <a:p>
+                <a:r>
+                  <a:rPr lang="en-US">
+                    <a:noFill/>
+                  </a:rPr>
+                  <a:t> </a:t>
+                </a:r>
+              </a:p>
+            </p:txBody>
+          </p:sp>
+        </mc:Fallback>
+      </mc:AlternateContent>
+      <mc:AlternateContent xmlns:mc="http://schemas.openxmlformats.org/markup-compatibility/2006">
+        <mc:Choice xmlns:a14="http://schemas.microsoft.com/office/drawing/2010/main" Requires="a14">
+          <p:sp>
+            <p:nvSpPr>
+              <p:cNvPr id="66" name="TextBox 65">
+                <a:extLst>
+                  <a:ext uri="{FF2B5EF4-FFF2-40B4-BE49-F238E27FC236}">
+                    <a16:creationId xmlns:a16="http://schemas.microsoft.com/office/drawing/2014/main" id="{D573EC0A-6417-4089-BD65-F9ED2D6CCAC2}"/>
+                  </a:ext>
+                </a:extLst>
+              </p:cNvPr>
+              <p:cNvSpPr txBox="1"/>
+              <p:nvPr/>
+            </p:nvSpPr>
+            <p:spPr>
+              <a:xfrm>
+                <a:off x="1972206" y="2613059"/>
+                <a:ext cx="1036629" cy="307777"/>
+              </a:xfrm>
+              <a:prstGeom prst="rect">
+                <a:avLst/>
+              </a:prstGeom>
+              <a:noFill/>
+            </p:spPr>
+            <p:txBody>
+              <a:bodyPr wrap="none" rtlCol="0">
+                <a:spAutoFit/>
+              </a:bodyPr>
+              <a:lstStyle/>
+              <a:p>
+                <a14:m>
+                  <m:oMathPara xmlns:m="http://schemas.openxmlformats.org/officeDocument/2006/math">
+                    <m:oMathParaPr>
+                      <m:jc m:val="centerGroup"/>
+                    </m:oMathParaPr>
+                    <m:oMath xmlns:m="http://schemas.openxmlformats.org/officeDocument/2006/math">
+                      <m:r>
+                        <a:rPr lang="en-US" sz="1400" b="0" i="1" smtClean="0">
+                          <a:latin typeface="Cambria Math" panose="02040503050406030204" pitchFamily="18" charset="0"/>
+                        </a:rPr>
+                        <m:t>𝑖</m:t>
+                      </m:r>
+                      <m:r>
+                        <a:rPr lang="en-US" sz="1400" b="0" i="1" smtClean="0">
+                          <a:latin typeface="Cambria Math" panose="02040503050406030204" pitchFamily="18" charset="0"/>
+                        </a:rPr>
+                        <m:t>−</m:t>
+                      </m:r>
+                      <m:r>
+                        <a:rPr lang="en-US" sz="1400" b="0" i="1" smtClean="0">
+                          <a:latin typeface="Cambria Math" panose="02040503050406030204" pitchFamily="18" charset="0"/>
+                        </a:rPr>
+                        <m:t>𝑗</m:t>
+                      </m:r>
+                      <m:r>
+                        <a:rPr lang="en-US" sz="1400" b="0" i="1" smtClean="0">
+                          <a:latin typeface="Cambria Math" panose="02040503050406030204" pitchFamily="18" charset="0"/>
+                        </a:rPr>
+                        <m:t>=−2</m:t>
+                      </m:r>
+                    </m:oMath>
+                  </m:oMathPara>
+                </a14:m>
+                <a:endParaRPr lang="en-US" sz="1600" dirty="0"/>
+              </a:p>
+            </p:txBody>
+          </p:sp>
+        </mc:Choice>
+        <mc:Fallback>
+          <p:sp>
+            <p:nvSpPr>
+              <p:cNvPr id="66" name="TextBox 65">
+                <a:extLst>
+                  <a:ext uri="{FF2B5EF4-FFF2-40B4-BE49-F238E27FC236}">
+                    <a16:creationId xmlns:a16="http://schemas.microsoft.com/office/drawing/2014/main" id="{D573EC0A-6417-4089-BD65-F9ED2D6CCAC2}"/>
+                  </a:ext>
+                </a:extLst>
+              </p:cNvPr>
+              <p:cNvSpPr txBox="1">
+                <a:spLocks noRot="1" noChangeAspect="1" noMove="1" noResize="1" noEditPoints="1" noAdjustHandles="1" noChangeArrowheads="1" noChangeShapeType="1" noTextEdit="1"/>
+              </p:cNvSpPr>
+              <p:nvPr/>
+            </p:nvSpPr>
+            <p:spPr>
+              <a:xfrm>
+                <a:off x="1972206" y="2613059"/>
+                <a:ext cx="1036629" cy="307777"/>
+              </a:xfrm>
+              <a:prstGeom prst="rect">
+                <a:avLst/>
+              </a:prstGeom>
+              <a:blipFill>
+                <a:blip r:embed="rId4"/>
+                <a:stretch>
+                  <a:fillRect b="-8000"/>
+                </a:stretch>
+              </a:blipFill>
+            </p:spPr>
+            <p:txBody>
+              <a:bodyPr/>
+              <a:lstStyle/>
+              <a:p>
+                <a:r>
+                  <a:rPr lang="en-US">
+                    <a:noFill/>
+                  </a:rPr>
+                  <a:t> </a:t>
+                </a:r>
+              </a:p>
+            </p:txBody>
+          </p:sp>
+        </mc:Fallback>
+      </mc:AlternateContent>
+      <mc:AlternateContent xmlns:mc="http://schemas.openxmlformats.org/markup-compatibility/2006">
+        <mc:Choice xmlns:a14="http://schemas.microsoft.com/office/drawing/2010/main" Requires="a14">
+          <p:sp>
+            <p:nvSpPr>
+              <p:cNvPr id="67" name="TextBox 66">
+                <a:extLst>
+                  <a:ext uri="{FF2B5EF4-FFF2-40B4-BE49-F238E27FC236}">
+                    <a16:creationId xmlns:a16="http://schemas.microsoft.com/office/drawing/2014/main" id="{7607BB90-B285-4526-A5C7-76ED08E9AAB0}"/>
+                  </a:ext>
+                </a:extLst>
+              </p:cNvPr>
+              <p:cNvSpPr txBox="1"/>
+              <p:nvPr/>
+            </p:nvSpPr>
+            <p:spPr>
+              <a:xfrm>
+                <a:off x="3100481" y="2621010"/>
+                <a:ext cx="1036629" cy="307777"/>
+              </a:xfrm>
+              <a:prstGeom prst="rect">
+                <a:avLst/>
+              </a:prstGeom>
+              <a:noFill/>
+            </p:spPr>
+            <p:txBody>
+              <a:bodyPr wrap="none" rtlCol="0">
+                <a:spAutoFit/>
+              </a:bodyPr>
+              <a:lstStyle/>
+              <a:p>
+                <a14:m>
+                  <m:oMathPara xmlns:m="http://schemas.openxmlformats.org/officeDocument/2006/math">
+                    <m:oMathParaPr>
+                      <m:jc m:val="centerGroup"/>
+                    </m:oMathParaPr>
+                    <m:oMath xmlns:m="http://schemas.openxmlformats.org/officeDocument/2006/math">
+                      <m:r>
+                        <a:rPr lang="en-US" sz="1400" b="0" i="1" smtClean="0">
+                          <a:latin typeface="Cambria Math" panose="02040503050406030204" pitchFamily="18" charset="0"/>
+                        </a:rPr>
+                        <m:t>𝑖</m:t>
+                      </m:r>
+                      <m:r>
+                        <a:rPr lang="en-US" sz="1400" b="0" i="1" smtClean="0">
+                          <a:latin typeface="Cambria Math" panose="02040503050406030204" pitchFamily="18" charset="0"/>
+                        </a:rPr>
+                        <m:t>−</m:t>
+                      </m:r>
+                      <m:r>
+                        <a:rPr lang="en-US" sz="1400" b="0" i="1" smtClean="0">
+                          <a:latin typeface="Cambria Math" panose="02040503050406030204" pitchFamily="18" charset="0"/>
+                        </a:rPr>
+                        <m:t>𝑗</m:t>
+                      </m:r>
+                      <m:r>
+                        <a:rPr lang="en-US" sz="1400" b="0" i="1" smtClean="0">
+                          <a:latin typeface="Cambria Math" panose="02040503050406030204" pitchFamily="18" charset="0"/>
+                        </a:rPr>
+                        <m:t>=−1</m:t>
+                      </m:r>
+                    </m:oMath>
+                  </m:oMathPara>
+                </a14:m>
+                <a:endParaRPr lang="en-US" sz="1600" dirty="0"/>
+              </a:p>
+            </p:txBody>
+          </p:sp>
+        </mc:Choice>
+        <mc:Fallback>
+          <p:sp>
+            <p:nvSpPr>
+              <p:cNvPr id="67" name="TextBox 66">
+                <a:extLst>
+                  <a:ext uri="{FF2B5EF4-FFF2-40B4-BE49-F238E27FC236}">
+                    <a16:creationId xmlns:a16="http://schemas.microsoft.com/office/drawing/2014/main" id="{7607BB90-B285-4526-A5C7-76ED08E9AAB0}"/>
+                  </a:ext>
+                </a:extLst>
+              </p:cNvPr>
+              <p:cNvSpPr txBox="1">
+                <a:spLocks noRot="1" noChangeAspect="1" noMove="1" noResize="1" noEditPoints="1" noAdjustHandles="1" noChangeArrowheads="1" noChangeShapeType="1" noTextEdit="1"/>
+              </p:cNvSpPr>
+              <p:nvPr/>
+            </p:nvSpPr>
+            <p:spPr>
+              <a:xfrm>
+                <a:off x="3100481" y="2621010"/>
+                <a:ext cx="1036629" cy="307777"/>
+              </a:xfrm>
+              <a:prstGeom prst="rect">
+                <a:avLst/>
+              </a:prstGeom>
+              <a:blipFill>
+                <a:blip r:embed="rId5"/>
+                <a:stretch>
+                  <a:fillRect b="-8000"/>
+                </a:stretch>
+              </a:blipFill>
+            </p:spPr>
+            <p:txBody>
+              <a:bodyPr/>
+              <a:lstStyle/>
+              <a:p>
+                <a:r>
+                  <a:rPr lang="en-US">
+                    <a:noFill/>
+                  </a:rPr>
+                  <a:t> </a:t>
+                </a:r>
+              </a:p>
+            </p:txBody>
+          </p:sp>
+        </mc:Fallback>
+      </mc:AlternateContent>
+      <mc:AlternateContent xmlns:mc="http://schemas.openxmlformats.org/markup-compatibility/2006">
+        <mc:Choice xmlns:a14="http://schemas.microsoft.com/office/drawing/2010/main" Requires="a14">
+          <p:sp>
+            <p:nvSpPr>
+              <p:cNvPr id="68" name="TextBox 67">
+                <a:extLst>
+                  <a:ext uri="{FF2B5EF4-FFF2-40B4-BE49-F238E27FC236}">
+                    <a16:creationId xmlns:a16="http://schemas.microsoft.com/office/drawing/2014/main" id="{739EF463-A18B-46C9-9ED0-C2F3E9E09163}"/>
+                  </a:ext>
+                </a:extLst>
+              </p:cNvPr>
+              <p:cNvSpPr txBox="1"/>
+              <p:nvPr/>
+            </p:nvSpPr>
+            <p:spPr>
+              <a:xfrm>
+                <a:off x="4211960" y="2613059"/>
+                <a:ext cx="901978" cy="307777"/>
+              </a:xfrm>
+              <a:prstGeom prst="rect">
+                <a:avLst/>
+              </a:prstGeom>
+              <a:noFill/>
+            </p:spPr>
+            <p:txBody>
+              <a:bodyPr wrap="none" rtlCol="0">
+                <a:spAutoFit/>
+              </a:bodyPr>
+              <a:lstStyle/>
+              <a:p>
+                <a14:m>
+                  <m:oMathPara xmlns:m="http://schemas.openxmlformats.org/officeDocument/2006/math">
+                    <m:oMathParaPr>
+                      <m:jc m:val="centerGroup"/>
+                    </m:oMathParaPr>
+                    <m:oMath xmlns:m="http://schemas.openxmlformats.org/officeDocument/2006/math">
+                      <m:r>
+                        <a:rPr lang="en-US" sz="1400" b="0" i="1" smtClean="0">
+                          <a:latin typeface="Cambria Math" panose="02040503050406030204" pitchFamily="18" charset="0"/>
+                        </a:rPr>
+                        <m:t>𝑖</m:t>
+                      </m:r>
+                      <m:r>
+                        <a:rPr lang="en-US" sz="1400" b="0" i="1" smtClean="0">
+                          <a:latin typeface="Cambria Math" panose="02040503050406030204" pitchFamily="18" charset="0"/>
+                        </a:rPr>
+                        <m:t>−</m:t>
+                      </m:r>
+                      <m:r>
+                        <a:rPr lang="en-US" sz="1400" b="0" i="1" smtClean="0">
+                          <a:latin typeface="Cambria Math" panose="02040503050406030204" pitchFamily="18" charset="0"/>
+                        </a:rPr>
+                        <m:t>𝑗</m:t>
+                      </m:r>
+                      <m:r>
+                        <a:rPr lang="en-US" sz="1400" b="0" i="1" smtClean="0">
+                          <a:latin typeface="Cambria Math" panose="02040503050406030204" pitchFamily="18" charset="0"/>
+                        </a:rPr>
+                        <m:t>=0</m:t>
+                      </m:r>
+                    </m:oMath>
+                  </m:oMathPara>
+                </a14:m>
+                <a:endParaRPr lang="en-US" sz="1600" dirty="0"/>
+              </a:p>
+            </p:txBody>
+          </p:sp>
+        </mc:Choice>
+        <mc:Fallback>
+          <p:sp>
+            <p:nvSpPr>
+              <p:cNvPr id="68" name="TextBox 67">
+                <a:extLst>
+                  <a:ext uri="{FF2B5EF4-FFF2-40B4-BE49-F238E27FC236}">
+                    <a16:creationId xmlns:a16="http://schemas.microsoft.com/office/drawing/2014/main" id="{739EF463-A18B-46C9-9ED0-C2F3E9E09163}"/>
+                  </a:ext>
+                </a:extLst>
+              </p:cNvPr>
+              <p:cNvSpPr txBox="1">
+                <a:spLocks noRot="1" noChangeAspect="1" noMove="1" noResize="1" noEditPoints="1" noAdjustHandles="1" noChangeArrowheads="1" noChangeShapeType="1" noTextEdit="1"/>
+              </p:cNvSpPr>
+              <p:nvPr/>
+            </p:nvSpPr>
+            <p:spPr>
+              <a:xfrm>
+                <a:off x="4211960" y="2613059"/>
+                <a:ext cx="901978" cy="307777"/>
+              </a:xfrm>
+              <a:prstGeom prst="rect">
+                <a:avLst/>
+              </a:prstGeom>
+              <a:blipFill>
+                <a:blip r:embed="rId6"/>
+                <a:stretch>
+                  <a:fillRect b="-8000"/>
+                </a:stretch>
+              </a:blipFill>
+            </p:spPr>
+            <p:txBody>
+              <a:bodyPr/>
+              <a:lstStyle/>
+              <a:p>
+                <a:r>
+                  <a:rPr lang="en-US">
+                    <a:noFill/>
+                  </a:rPr>
+                  <a:t> </a:t>
+                </a:r>
+              </a:p>
+            </p:txBody>
+          </p:sp>
+        </mc:Fallback>
+      </mc:AlternateContent>
+    </p:spTree>
+    <p:extLst>
+      <p:ext uri="{BB962C8B-B14F-4D97-AF65-F5344CB8AC3E}">
+        <p14:creationId xmlns:p14="http://schemas.microsoft.com/office/powerpoint/2010/main" val="3726542055"/>
       </p:ext>
     </p:extLst>
   </p:cSld>

</xml_diff>